<commit_message>
Modelagem de dados V3 completa e revisada
</commit_message>
<xml_diff>
--- a/Documentação/HLD&LLD/LLD v3.0.pptx
+++ b/Documentação/HLD&LLD/LLD v3.0.pptx
@@ -259,7 +259,7 @@
           <a:p>
             <a:fld id="{ADD8D629-AC3F-4FFB-A7F2-C28F670F0355}" type="datetimeFigureOut">
               <a:rPr lang="pt-BR" smtClean="0"/>
-              <a:t>02/10/2020</a:t>
+              <a:t>05/10/2020</a:t>
             </a:fld>
             <a:endParaRPr lang="pt-BR"/>
           </a:p>
@@ -457,7 +457,7 @@
           <a:p>
             <a:fld id="{ADD8D629-AC3F-4FFB-A7F2-C28F670F0355}" type="datetimeFigureOut">
               <a:rPr lang="pt-BR" smtClean="0"/>
-              <a:t>02/10/2020</a:t>
+              <a:t>05/10/2020</a:t>
             </a:fld>
             <a:endParaRPr lang="pt-BR"/>
           </a:p>
@@ -665,7 +665,7 @@
           <a:p>
             <a:fld id="{ADD8D629-AC3F-4FFB-A7F2-C28F670F0355}" type="datetimeFigureOut">
               <a:rPr lang="pt-BR" smtClean="0"/>
-              <a:t>02/10/2020</a:t>
+              <a:t>05/10/2020</a:t>
             </a:fld>
             <a:endParaRPr lang="pt-BR"/>
           </a:p>
@@ -863,7 +863,7 @@
           <a:p>
             <a:fld id="{ADD8D629-AC3F-4FFB-A7F2-C28F670F0355}" type="datetimeFigureOut">
               <a:rPr lang="pt-BR" smtClean="0"/>
-              <a:t>02/10/2020</a:t>
+              <a:t>05/10/2020</a:t>
             </a:fld>
             <a:endParaRPr lang="pt-BR"/>
           </a:p>
@@ -1138,7 +1138,7 @@
           <a:p>
             <a:fld id="{ADD8D629-AC3F-4FFB-A7F2-C28F670F0355}" type="datetimeFigureOut">
               <a:rPr lang="pt-BR" smtClean="0"/>
-              <a:t>02/10/2020</a:t>
+              <a:t>05/10/2020</a:t>
             </a:fld>
             <a:endParaRPr lang="pt-BR"/>
           </a:p>
@@ -1403,7 +1403,7 @@
           <a:p>
             <a:fld id="{ADD8D629-AC3F-4FFB-A7F2-C28F670F0355}" type="datetimeFigureOut">
               <a:rPr lang="pt-BR" smtClean="0"/>
-              <a:t>02/10/2020</a:t>
+              <a:t>05/10/2020</a:t>
             </a:fld>
             <a:endParaRPr lang="pt-BR"/>
           </a:p>
@@ -1815,7 +1815,7 @@
           <a:p>
             <a:fld id="{ADD8D629-AC3F-4FFB-A7F2-C28F670F0355}" type="datetimeFigureOut">
               <a:rPr lang="pt-BR" smtClean="0"/>
-              <a:t>02/10/2020</a:t>
+              <a:t>05/10/2020</a:t>
             </a:fld>
             <a:endParaRPr lang="pt-BR"/>
           </a:p>
@@ -1956,7 +1956,7 @@
           <a:p>
             <a:fld id="{ADD8D629-AC3F-4FFB-A7F2-C28F670F0355}" type="datetimeFigureOut">
               <a:rPr lang="pt-BR" smtClean="0"/>
-              <a:t>02/10/2020</a:t>
+              <a:t>05/10/2020</a:t>
             </a:fld>
             <a:endParaRPr lang="pt-BR"/>
           </a:p>
@@ -2069,7 +2069,7 @@
           <a:p>
             <a:fld id="{ADD8D629-AC3F-4FFB-A7F2-C28F670F0355}" type="datetimeFigureOut">
               <a:rPr lang="pt-BR" smtClean="0"/>
-              <a:t>02/10/2020</a:t>
+              <a:t>05/10/2020</a:t>
             </a:fld>
             <a:endParaRPr lang="pt-BR"/>
           </a:p>
@@ -2380,7 +2380,7 @@
           <a:p>
             <a:fld id="{ADD8D629-AC3F-4FFB-A7F2-C28F670F0355}" type="datetimeFigureOut">
               <a:rPr lang="pt-BR" smtClean="0"/>
-              <a:t>02/10/2020</a:t>
+              <a:t>05/10/2020</a:t>
             </a:fld>
             <a:endParaRPr lang="pt-BR"/>
           </a:p>
@@ -2668,7 +2668,7 @@
           <a:p>
             <a:fld id="{ADD8D629-AC3F-4FFB-A7F2-C28F670F0355}" type="datetimeFigureOut">
               <a:rPr lang="pt-BR" smtClean="0"/>
-              <a:t>02/10/2020</a:t>
+              <a:t>05/10/2020</a:t>
             </a:fld>
             <a:endParaRPr lang="pt-BR"/>
           </a:p>
@@ -2909,7 +2909,7 @@
           <a:p>
             <a:fld id="{ADD8D629-AC3F-4FFB-A7F2-C28F670F0355}" type="datetimeFigureOut">
               <a:rPr lang="pt-BR" smtClean="0"/>
-              <a:t>02/10/2020</a:t>
+              <a:t>05/10/2020</a:t>
             </a:fld>
             <a:endParaRPr lang="pt-BR"/>
           </a:p>
@@ -3353,8 +3353,8 @@
           </a:stretch>
         </p:blipFill>
         <p:spPr>
-          <a:xfrm rot="19055111">
-            <a:off x="5768986" y="4285044"/>
+          <a:xfrm rot="278951">
+            <a:off x="6438534" y="2177899"/>
             <a:ext cx="677989" cy="677989"/>
           </a:xfrm>
           <a:prstGeom prst="rect">
@@ -3362,180 +3362,6 @@
           </a:prstGeom>
         </p:spPr>
       </p:pic>
-      <p:sp>
-        <p:nvSpPr>
-          <p:cNvPr id="11" name="CaixaDeTexto 10">
-            <a:extLst>
-              <a:ext uri="{FF2B5EF4-FFF2-40B4-BE49-F238E27FC236}">
-                <a16:creationId xmlns:a16="http://schemas.microsoft.com/office/drawing/2014/main" id="{61090381-D74C-48CE-A63D-C1E72D40917A}"/>
-              </a:ext>
-            </a:extLst>
-          </p:cNvPr>
-          <p:cNvSpPr txBox="1"/>
-          <p:nvPr/>
-        </p:nvSpPr>
-        <p:spPr>
-          <a:xfrm>
-            <a:off x="795944" y="1805192"/>
-            <a:ext cx="1203287" cy="369332"/>
-          </a:xfrm>
-          <a:prstGeom prst="rect">
-            <a:avLst/>
-          </a:prstGeom>
-          <a:noFill/>
-        </p:spPr>
-        <p:txBody>
-          <a:bodyPr wrap="square">
-            <a:spAutoFit/>
-          </a:bodyPr>
-          <a:lstStyle/>
-          <a:p>
-            <a:r>
-              <a:rPr lang="sv-SE" b="1" dirty="0"/>
-              <a:t>wi-fi / Lan</a:t>
-            </a:r>
-            <a:endParaRPr lang="pt-BR" b="1" dirty="0"/>
-          </a:p>
-        </p:txBody>
-      </p:sp>
-      <p:grpSp>
-        <p:nvGrpSpPr>
-          <p:cNvPr id="3" name="Agrupar 2">
-            <a:extLst>
-              <a:ext uri="{FF2B5EF4-FFF2-40B4-BE49-F238E27FC236}">
-                <a16:creationId xmlns:a16="http://schemas.microsoft.com/office/drawing/2014/main" id="{045D3CCD-A5C7-47FA-8A44-B8E234196441}"/>
-              </a:ext>
-            </a:extLst>
-          </p:cNvPr>
-          <p:cNvGrpSpPr/>
-          <p:nvPr/>
-        </p:nvGrpSpPr>
-        <p:grpSpPr>
-          <a:xfrm>
-            <a:off x="555156" y="61957"/>
-            <a:ext cx="1916483" cy="1916483"/>
-            <a:chOff x="10186336" y="207462"/>
-            <a:chExt cx="1916483" cy="1916483"/>
-          </a:xfrm>
-        </p:grpSpPr>
-        <p:pic>
-          <p:nvPicPr>
-            <p:cNvPr id="5" name="Imagem 4" descr="Teclado de computador&#10;&#10;Descrição gerada automaticamente">
-              <a:extLst>
-                <a:ext uri="{FF2B5EF4-FFF2-40B4-BE49-F238E27FC236}">
-                  <a16:creationId xmlns:a16="http://schemas.microsoft.com/office/drawing/2014/main" id="{DC10494B-E29F-4095-B00F-C8E55B50B3D2}"/>
-                </a:ext>
-              </a:extLst>
-            </p:cNvPr>
-            <p:cNvPicPr>
-              <a:picLocks noChangeAspect="1"/>
-            </p:cNvPicPr>
-            <p:nvPr/>
-          </p:nvPicPr>
-          <p:blipFill>
-            <a:blip r:embed="rId3">
-              <a:extLst>
-                <a:ext uri="{BEBA8EAE-BF5A-486C-A8C5-ECC9F3942E4B}">
-                  <a14:imgProps xmlns:a14="http://schemas.microsoft.com/office/drawing/2010/main">
-                    <a14:imgLayer r:embed="rId4">
-                      <a14:imgEffect>
-                        <a14:brightnessContrast bright="-40000" contrast="40000"/>
-                      </a14:imgEffect>
-                    </a14:imgLayer>
-                  </a14:imgProps>
-                </a:ext>
-                <a:ext uri="{28A0092B-C50C-407E-A947-70E740481C1C}">
-                  <a14:useLocalDpi xmlns:a14="http://schemas.microsoft.com/office/drawing/2010/main" val="0"/>
-                </a:ext>
-              </a:extLst>
-            </a:blip>
-            <a:stretch>
-              <a:fillRect/>
-            </a:stretch>
-          </p:blipFill>
-          <p:spPr>
-            <a:xfrm>
-              <a:off x="10186336" y="207462"/>
-              <a:ext cx="1916483" cy="1916483"/>
-            </a:xfrm>
-            <a:prstGeom prst="rect">
-              <a:avLst/>
-            </a:prstGeom>
-          </p:spPr>
-        </p:pic>
-        <p:pic>
-          <p:nvPicPr>
-            <p:cNvPr id="9" name="Imagem 8" descr="Uma imagem contendo desenho&#10;&#10;Descrição gerada automaticamente">
-              <a:extLst>
-                <a:ext uri="{FF2B5EF4-FFF2-40B4-BE49-F238E27FC236}">
-                  <a16:creationId xmlns:a16="http://schemas.microsoft.com/office/drawing/2014/main" id="{DB78A706-70B8-4397-9B0F-FF80E2A4E513}"/>
-                </a:ext>
-              </a:extLst>
-            </p:cNvPr>
-            <p:cNvPicPr>
-              <a:picLocks noChangeAspect="1"/>
-            </p:cNvPicPr>
-            <p:nvPr/>
-          </p:nvPicPr>
-          <p:blipFill>
-            <a:blip r:embed="rId5">
-              <a:extLst>
-                <a:ext uri="{28A0092B-C50C-407E-A947-70E740481C1C}">
-                  <a14:useLocalDpi xmlns:a14="http://schemas.microsoft.com/office/drawing/2010/main" val="0"/>
-                </a:ext>
-              </a:extLst>
-            </a:blip>
-            <a:stretch>
-              <a:fillRect/>
-            </a:stretch>
-          </p:blipFill>
-          <p:spPr>
-            <a:xfrm>
-              <a:off x="10436036" y="587705"/>
-              <a:ext cx="1013329" cy="519836"/>
-            </a:xfrm>
-            <a:prstGeom prst="rect">
-              <a:avLst/>
-            </a:prstGeom>
-          </p:spPr>
-        </p:pic>
-        <p:pic>
-          <p:nvPicPr>
-            <p:cNvPr id="18" name="Imagem 17" descr="Uma imagem contendo Forma&#10;&#10;Descrição gerada automaticamente">
-              <a:extLst>
-                <a:ext uri="{FF2B5EF4-FFF2-40B4-BE49-F238E27FC236}">
-                  <a16:creationId xmlns:a16="http://schemas.microsoft.com/office/drawing/2014/main" id="{72061F49-A444-473A-BD81-1F4F83EB383C}"/>
-                </a:ext>
-              </a:extLst>
-            </p:cNvPr>
-            <p:cNvPicPr>
-              <a:picLocks noChangeAspect="1"/>
-            </p:cNvPicPr>
-            <p:nvPr/>
-          </p:nvPicPr>
-          <p:blipFill>
-            <a:blip r:embed="rId6">
-              <a:extLst>
-                <a:ext uri="{28A0092B-C50C-407E-A947-70E740481C1C}">
-                  <a14:useLocalDpi xmlns:a14="http://schemas.microsoft.com/office/drawing/2010/main" val="0"/>
-                </a:ext>
-              </a:extLst>
-            </a:blip>
-            <a:stretch>
-              <a:fillRect/>
-            </a:stretch>
-          </p:blipFill>
-          <p:spPr>
-            <a:xfrm>
-              <a:off x="11277820" y="710421"/>
-              <a:ext cx="137204" cy="137202"/>
-            </a:xfrm>
-            <a:prstGeom prst="rect">
-              <a:avLst/>
-            </a:prstGeom>
-          </p:spPr>
-        </p:pic>
-      </p:grpSp>
       <p:pic>
         <p:nvPicPr>
           <p:cNvPr id="29" name="Imagem 28" descr="Uma imagem contendo Forma&#10;&#10;Descrição gerada automaticamente">
@@ -3551,7 +3377,7 @@
           <p:nvPr/>
         </p:nvPicPr>
         <p:blipFill>
-          <a:blip r:embed="rId7">
+          <a:blip r:embed="rId3">
             <a:extLst>
               <a:ext uri="{28A0092B-C50C-407E-A947-70E740481C1C}">
                 <a14:useLocalDpi xmlns:a14="http://schemas.microsoft.com/office/drawing/2010/main" val="0"/>
@@ -3586,10 +3412,10 @@
         </p:nvGrpSpPr>
         <p:grpSpPr>
           <a:xfrm>
-            <a:off x="3433004" y="544188"/>
-            <a:ext cx="3704336" cy="1744051"/>
-            <a:chOff x="6071009" y="4930367"/>
-            <a:chExt cx="3704336" cy="1744051"/>
+            <a:off x="1696497" y="-65741"/>
+            <a:ext cx="4192487" cy="2850958"/>
+            <a:chOff x="5228075" y="4628558"/>
+            <a:chExt cx="4192487" cy="2850958"/>
           </a:xfrm>
         </p:grpSpPr>
         <p:sp>
@@ -3606,8 +3432,8 @@
           </p:nvSpPr>
           <p:spPr>
             <a:xfrm>
-              <a:off x="6071009" y="4930367"/>
-              <a:ext cx="3704336" cy="1744051"/>
+              <a:off x="5228075" y="4628558"/>
+              <a:ext cx="4192487" cy="2850958"/>
             </a:xfrm>
             <a:prstGeom prst="roundRect">
               <a:avLst>
@@ -3665,7 +3491,7 @@
             <p:nvPr/>
           </p:nvPicPr>
           <p:blipFill>
-            <a:blip r:embed="rId8">
+            <a:blip r:embed="rId4">
               <a:extLst>
                 <a:ext uri="{28A0092B-C50C-407E-A947-70E740481C1C}">
                   <a14:useLocalDpi xmlns:a14="http://schemas.microsoft.com/office/drawing/2010/main" val="0"/>
@@ -3678,8 +3504,8 @@
           </p:blipFill>
           <p:spPr>
             <a:xfrm>
-              <a:off x="6298142" y="5223563"/>
-              <a:ext cx="1136085" cy="1136085"/>
+              <a:off x="7617222" y="5889621"/>
+              <a:ext cx="730713" cy="730713"/>
             </a:xfrm>
             <a:prstGeom prst="rect">
               <a:avLst/>
@@ -3701,7 +3527,7 @@
             <p:nvPr/>
           </p:nvPicPr>
           <p:blipFill rotWithShape="1">
-            <a:blip r:embed="rId9">
+            <a:blip r:embed="rId5">
               <a:extLst>
                 <a:ext uri="{28A0092B-C50C-407E-A947-70E740481C1C}">
                   <a14:useLocalDpi xmlns:a14="http://schemas.microsoft.com/office/drawing/2010/main" val="0"/>
@@ -3713,8 +3539,8 @@
           </p:blipFill>
           <p:spPr>
             <a:xfrm>
-              <a:off x="8281955" y="5334816"/>
-              <a:ext cx="1305581" cy="974439"/>
+              <a:off x="8033087" y="5154670"/>
+              <a:ext cx="736142" cy="549430"/>
             </a:xfrm>
             <a:prstGeom prst="rect">
               <a:avLst/>
@@ -3735,7 +3561,7 @@
           </p:nvCxnSpPr>
           <p:spPr>
             <a:xfrm>
-              <a:off x="7789799" y="5273957"/>
+              <a:off x="9008999" y="6351546"/>
               <a:ext cx="0" cy="1035298"/>
             </a:xfrm>
             <a:prstGeom prst="line">
@@ -3772,7 +3598,7 @@
           </p:nvSpPr>
           <p:spPr>
             <a:xfrm>
-              <a:off x="8586137" y="6319769"/>
+              <a:off x="8079169" y="5749314"/>
               <a:ext cx="816879" cy="307777"/>
             </a:xfrm>
             <a:prstGeom prst="rect">
@@ -3812,7 +3638,7 @@
           </p:nvSpPr>
           <p:spPr>
             <a:xfrm>
-              <a:off x="6622976" y="6319769"/>
+              <a:off x="7920497" y="6783481"/>
               <a:ext cx="486415" cy="307777"/>
             </a:xfrm>
             <a:prstGeom prst="rect">
@@ -3854,7 +3680,7 @@
           <p:nvPr/>
         </p:nvPicPr>
         <p:blipFill>
-          <a:blip r:embed="rId7">
+          <a:blip r:embed="rId3">
             <a:extLst>
               <a:ext uri="{28A0092B-C50C-407E-A947-70E740481C1C}">
                 <a14:useLocalDpi xmlns:a14="http://schemas.microsoft.com/office/drawing/2010/main" val="0"/>
@@ -3889,7 +3715,7 @@
         </p:nvGrpSpPr>
         <p:grpSpPr>
           <a:xfrm>
-            <a:off x="6949373" y="1709638"/>
+            <a:off x="7266538" y="2105968"/>
             <a:ext cx="4861631" cy="3104469"/>
             <a:chOff x="26652" y="3629777"/>
             <a:chExt cx="4861631" cy="3104469"/>
@@ -3959,11 +3785,11 @@
             <p:nvPr/>
           </p:nvPicPr>
           <p:blipFill>
-            <a:blip r:embed="rId10">
+            <a:blip r:embed="rId6">
               <a:extLst>
                 <a:ext uri="{BEBA8EAE-BF5A-486C-A8C5-ECC9F3942E4B}">
                   <a14:imgProps xmlns:a14="http://schemas.microsoft.com/office/drawing/2010/main">
-                    <a14:imgLayer r:embed="rId11">
+                    <a14:imgLayer r:embed="rId7">
                       <a14:imgEffect>
                         <a14:brightnessContrast bright="-20000" contrast="40000"/>
                       </a14:imgEffect>
@@ -4004,7 +3830,7 @@
             <p:nvPr/>
           </p:nvPicPr>
           <p:blipFill>
-            <a:blip r:embed="rId12">
+            <a:blip r:embed="rId8">
               <a:extLst>
                 <a:ext uri="{28A0092B-C50C-407E-A947-70E740481C1C}">
                   <a14:useLocalDpi xmlns:a14="http://schemas.microsoft.com/office/drawing/2010/main" val="0"/>
@@ -4040,7 +3866,7 @@
             <p:nvPr/>
           </p:nvPicPr>
           <p:blipFill>
-            <a:blip r:embed="rId13">
+            <a:blip r:embed="rId9">
               <a:extLst>
                 <a:ext uri="{28A0092B-C50C-407E-A947-70E740481C1C}">
                   <a14:useLocalDpi xmlns:a14="http://schemas.microsoft.com/office/drawing/2010/main" val="0"/>
@@ -4076,7 +3902,7 @@
             <p:nvPr/>
           </p:nvPicPr>
           <p:blipFill>
-            <a:blip r:embed="rId14">
+            <a:blip r:embed="rId10">
               <a:extLst>
                 <a:ext uri="{28A0092B-C50C-407E-A947-70E740481C1C}">
                   <a14:useLocalDpi xmlns:a14="http://schemas.microsoft.com/office/drawing/2010/main" val="0"/>
@@ -4113,7 +3939,7 @@
           <p:nvPr/>
         </p:nvPicPr>
         <p:blipFill>
-          <a:blip r:embed="rId7">
+          <a:blip r:embed="rId3">
             <a:extLst>
               <a:ext uri="{28A0092B-C50C-407E-A947-70E740481C1C}">
                 <a14:useLocalDpi xmlns:a14="http://schemas.microsoft.com/office/drawing/2010/main" val="0"/>
@@ -4125,9 +3951,9 @@
           </a:stretch>
         </p:blipFill>
         <p:spPr>
-          <a:xfrm rot="7466156" flipV="1">
-            <a:off x="4537658" y="3924592"/>
-            <a:ext cx="1073106" cy="1020598"/>
+          <a:xfrm rot="7613834" flipV="1">
+            <a:off x="8573111" y="5318576"/>
+            <a:ext cx="1073106" cy="677181"/>
           </a:xfrm>
           <a:prstGeom prst="rect">
             <a:avLst/>
@@ -4148,7 +3974,7 @@
         </p:nvGrpSpPr>
         <p:grpSpPr>
           <a:xfrm>
-            <a:off x="4898661" y="4475787"/>
+            <a:off x="3777924" y="4362028"/>
             <a:ext cx="4232797" cy="2188824"/>
             <a:chOff x="129179" y="147679"/>
             <a:chExt cx="4232797" cy="2188824"/>
@@ -4247,11 +4073,11 @@
               <p:nvPr/>
             </p:nvPicPr>
             <p:blipFill rotWithShape="1">
-              <a:blip r:embed="rId15">
+              <a:blip r:embed="rId11">
                 <a:extLst>
                   <a:ext uri="{BEBA8EAE-BF5A-486C-A8C5-ECC9F3942E4B}">
                     <a14:imgProps xmlns:a14="http://schemas.microsoft.com/office/drawing/2010/main">
-                      <a14:imgLayer r:embed="rId16">
+                      <a14:imgLayer r:embed="rId12">
                         <a14:imgEffect>
                           <a14:brightnessContrast bright="-37000" contrast="64000"/>
                         </a14:imgEffect>
@@ -4291,11 +4117,11 @@
               <p:nvPr/>
             </p:nvPicPr>
             <p:blipFill>
-              <a:blip r:embed="rId3">
+              <a:blip r:embed="rId13">
                 <a:extLst>
                   <a:ext uri="{BEBA8EAE-BF5A-486C-A8C5-ECC9F3942E4B}">
                     <a14:imgProps xmlns:a14="http://schemas.microsoft.com/office/drawing/2010/main">
-                      <a14:imgLayer r:embed="rId4">
+                      <a14:imgLayer r:embed="rId14">
                         <a14:imgEffect>
                           <a14:brightnessContrast bright="-40000" contrast="40000"/>
                         </a14:imgEffect>
@@ -4337,7 +4163,7 @@
             <p:nvPr/>
           </p:nvPicPr>
           <p:blipFill>
-            <a:blip r:embed="rId17">
+            <a:blip r:embed="rId15">
               <a:extLst>
                 <a:ext uri="{28A0092B-C50C-407E-A947-70E740481C1C}">
                   <a14:useLocalDpi xmlns:a14="http://schemas.microsoft.com/office/drawing/2010/main" val="0"/>
@@ -4373,11 +4199,11 @@
             <p:nvPr/>
           </p:nvPicPr>
           <p:blipFill rotWithShape="1">
-            <a:blip r:embed="rId18">
+            <a:blip r:embed="rId16">
               <a:extLst>
                 <a:ext uri="{BEBA8EAE-BF5A-486C-A8C5-ECC9F3942E4B}">
                   <a14:imgProps xmlns:a14="http://schemas.microsoft.com/office/drawing/2010/main">
-                    <a14:imgLayer r:embed="rId19">
+                    <a14:imgLayer r:embed="rId17">
                       <a14:imgEffect>
                         <a14:backgroundRemoval t="26429" b="69286" l="8036" r="93750">
                           <a14:foregroundMark x1="9821" y1="43095" x2="9821" y2="43095"/>
@@ -4545,45 +4371,9 @@
           </a:stretch>
         </p:blipFill>
         <p:spPr>
-          <a:xfrm flipH="1">
-            <a:off x="5725210" y="3383729"/>
+          <a:xfrm rot="1292321" flipH="1">
+            <a:off x="6405428" y="66008"/>
             <a:ext cx="631361" cy="677989"/>
-          </a:xfrm>
-          <a:prstGeom prst="rect">
-            <a:avLst/>
-          </a:prstGeom>
-        </p:spPr>
-      </p:pic>
-      <p:pic>
-        <p:nvPicPr>
-          <p:cNvPr id="112" name="Imagem 111" descr="Uma imagem contendo Forma&#10;&#10;Descrição gerada automaticamente">
-            <a:extLst>
-              <a:ext uri="{FF2B5EF4-FFF2-40B4-BE49-F238E27FC236}">
-                <a16:creationId xmlns:a16="http://schemas.microsoft.com/office/drawing/2014/main" id="{E6C9F10A-8D94-40F0-B7EA-023CD6DDB228}"/>
-              </a:ext>
-            </a:extLst>
-          </p:cNvPr>
-          <p:cNvPicPr>
-            <a:picLocks noChangeAspect="1"/>
-          </p:cNvPicPr>
-          <p:nvPr/>
-        </p:nvPicPr>
-        <p:blipFill>
-          <a:blip r:embed="rId17">
-            <a:extLst>
-              <a:ext uri="{28A0092B-C50C-407E-A947-70E740481C1C}">
-                <a14:useLocalDpi xmlns:a14="http://schemas.microsoft.com/office/drawing/2010/main" val="0"/>
-              </a:ext>
-            </a:extLst>
-          </a:blip>
-          <a:stretch>
-            <a:fillRect/>
-          </a:stretch>
-        </p:blipFill>
-        <p:spPr>
-          <a:xfrm>
-            <a:off x="1158667" y="2164251"/>
-            <a:ext cx="383115" cy="383115"/>
           </a:xfrm>
           <a:prstGeom prst="rect">
             <a:avLst/>
@@ -4641,7 +4431,7 @@
           <p:nvPr/>
         </p:nvPicPr>
         <p:blipFill>
-          <a:blip r:embed="rId7">
+          <a:blip r:embed="rId3">
             <a:extLst>
               <a:ext uri="{28A0092B-C50C-407E-A947-70E740481C1C}">
                 <a14:useLocalDpi xmlns:a14="http://schemas.microsoft.com/office/drawing/2010/main" val="0"/>
@@ -4654,7 +4444,7 @@
         </p:blipFill>
         <p:spPr>
           <a:xfrm rot="10800000">
-            <a:off x="4111703" y="5505468"/>
+            <a:off x="2323876" y="5818672"/>
             <a:ext cx="1068918" cy="1016555"/>
           </a:xfrm>
           <a:prstGeom prst="rect">
@@ -4677,7 +4467,7 @@
           <p:nvPr/>
         </p:nvPicPr>
         <p:blipFill>
-          <a:blip r:embed="rId20">
+          <a:blip r:embed="rId18">
             <a:extLst>
               <a:ext uri="{28A0092B-C50C-407E-A947-70E740481C1C}">
                 <a14:useLocalDpi xmlns:a14="http://schemas.microsoft.com/office/drawing/2010/main" val="0"/>
@@ -4690,7 +4480,7 @@
         </p:blipFill>
         <p:spPr>
           <a:xfrm>
-            <a:off x="6713518" y="5270398"/>
+            <a:off x="9047801" y="155700"/>
             <a:ext cx="934149" cy="825522"/>
           </a:xfrm>
           <a:prstGeom prst="rect">
@@ -4712,7 +4502,7 @@
         </p:nvGrpSpPr>
         <p:grpSpPr>
           <a:xfrm>
-            <a:off x="1360139" y="3623153"/>
+            <a:off x="40880" y="3544407"/>
             <a:ext cx="3411194" cy="1917553"/>
             <a:chOff x="5814815" y="1343603"/>
             <a:chExt cx="3851791" cy="2165228"/>
@@ -4791,7 +4581,7 @@
             <p:nvPr/>
           </p:nvPicPr>
           <p:blipFill rotWithShape="1">
-            <a:blip r:embed="rId21">
+            <a:blip r:embed="rId19">
               <a:extLst>
                 <a:ext uri="{28A0092B-C50C-407E-A947-70E740481C1C}">
                   <a14:useLocalDpi xmlns:a14="http://schemas.microsoft.com/office/drawing/2010/main" val="0"/>
@@ -4863,7 +4653,7 @@
             <p:nvPr/>
           </p:nvPicPr>
           <p:blipFill>
-            <a:blip r:embed="rId22">
+            <a:blip r:embed="rId20">
               <a:extLst>
                 <a:ext uri="{28A0092B-C50C-407E-A947-70E740481C1C}">
                   <a14:useLocalDpi xmlns:a14="http://schemas.microsoft.com/office/drawing/2010/main" val="0"/>
@@ -4899,7 +4689,7 @@
             <p:nvPr/>
           </p:nvPicPr>
           <p:blipFill>
-            <a:blip r:embed="rId23">
+            <a:blip r:embed="rId21">
               <a:extLst>
                 <a:ext uri="{28A0092B-C50C-407E-A947-70E740481C1C}">
                   <a14:useLocalDpi xmlns:a14="http://schemas.microsoft.com/office/drawing/2010/main" val="0"/>
@@ -4956,7 +4746,7 @@
             <p:nvPr/>
           </p:nvPicPr>
           <p:blipFill>
-            <a:blip r:embed="rId24">
+            <a:blip r:embed="rId22">
               <a:extLst>
                 <a:ext uri="{28A0092B-C50C-407E-A947-70E740481C1C}">
                   <a14:useLocalDpi xmlns:a14="http://schemas.microsoft.com/office/drawing/2010/main" val="0"/>
@@ -4992,7 +4782,7 @@
             <p:nvPr/>
           </p:nvPicPr>
           <p:blipFill>
-            <a:blip r:embed="rId25">
+            <a:blip r:embed="rId23">
               <a:extLst>
                 <a:ext uri="{28A0092B-C50C-407E-A947-70E740481C1C}">
                   <a14:useLocalDpi xmlns:a14="http://schemas.microsoft.com/office/drawing/2010/main" val="0"/>
@@ -5028,7 +4818,7 @@
             <p:nvPr/>
           </p:nvPicPr>
           <p:blipFill>
-            <a:blip r:embed="rId24">
+            <a:blip r:embed="rId22">
               <a:extLst>
                 <a:ext uri="{28A0092B-C50C-407E-A947-70E740481C1C}">
                   <a14:useLocalDpi xmlns:a14="http://schemas.microsoft.com/office/drawing/2010/main" val="0"/>
@@ -5064,7 +4854,7 @@
             <p:nvPr/>
           </p:nvPicPr>
           <p:blipFill>
-            <a:blip r:embed="rId25">
+            <a:blip r:embed="rId23">
               <a:extLst>
                 <a:ext uri="{28A0092B-C50C-407E-A947-70E740481C1C}">
                   <a14:useLocalDpi xmlns:a14="http://schemas.microsoft.com/office/drawing/2010/main" val="0"/>
@@ -5100,7 +4890,7 @@
             <p:nvPr/>
           </p:nvPicPr>
           <p:blipFill>
-            <a:blip r:embed="rId24">
+            <a:blip r:embed="rId22">
               <a:extLst>
                 <a:ext uri="{28A0092B-C50C-407E-A947-70E740481C1C}">
                   <a14:useLocalDpi xmlns:a14="http://schemas.microsoft.com/office/drawing/2010/main" val="0"/>
@@ -5136,7 +4926,7 @@
             <p:nvPr/>
           </p:nvPicPr>
           <p:blipFill>
-            <a:blip r:embed="rId25">
+            <a:blip r:embed="rId23">
               <a:extLst>
                 <a:ext uri="{28A0092B-C50C-407E-A947-70E740481C1C}">
                   <a14:useLocalDpi xmlns:a14="http://schemas.microsoft.com/office/drawing/2010/main" val="0"/>
@@ -5172,7 +4962,7 @@
             <p:nvPr/>
           </p:nvPicPr>
           <p:blipFill>
-            <a:blip r:embed="rId24">
+            <a:blip r:embed="rId22">
               <a:extLst>
                 <a:ext uri="{28A0092B-C50C-407E-A947-70E740481C1C}">
                   <a14:useLocalDpi xmlns:a14="http://schemas.microsoft.com/office/drawing/2010/main" val="0"/>
@@ -5208,7 +4998,7 @@
             <p:nvPr/>
           </p:nvPicPr>
           <p:blipFill>
-            <a:blip r:embed="rId25">
+            <a:blip r:embed="rId23">
               <a:extLst>
                 <a:ext uri="{28A0092B-C50C-407E-A947-70E740481C1C}">
                   <a14:useLocalDpi xmlns:a14="http://schemas.microsoft.com/office/drawing/2010/main" val="0"/>
@@ -5245,7 +5035,7 @@
           <p:nvPr/>
         </p:nvPicPr>
         <p:blipFill>
-          <a:blip r:embed="rId7">
+          <a:blip r:embed="rId3">
             <a:extLst>
               <a:ext uri="{28A0092B-C50C-407E-A947-70E740481C1C}">
                 <a14:useLocalDpi xmlns:a14="http://schemas.microsoft.com/office/drawing/2010/main" val="0"/>
@@ -5257,9 +5047,219 @@
           </a:stretch>
         </p:blipFill>
         <p:spPr>
-          <a:xfrm rot="13618300" flipV="1">
-            <a:off x="7296581" y="832780"/>
-            <a:ext cx="1160151" cy="634897"/>
+          <a:xfrm rot="13320590" flipV="1">
+            <a:off x="6646533" y="1301163"/>
+            <a:ext cx="1496115" cy="634897"/>
+          </a:xfrm>
+          <a:prstGeom prst="rect">
+            <a:avLst/>
+          </a:prstGeom>
+        </p:spPr>
+      </p:pic>
+      <p:grpSp>
+        <p:nvGrpSpPr>
+          <p:cNvPr id="3" name="Agrupar 2">
+            <a:extLst>
+              <a:ext uri="{FF2B5EF4-FFF2-40B4-BE49-F238E27FC236}">
+                <a16:creationId xmlns:a16="http://schemas.microsoft.com/office/drawing/2014/main" id="{045D3CCD-A5C7-47FA-8A44-B8E234196441}"/>
+              </a:ext>
+            </a:extLst>
+          </p:cNvPr>
+          <p:cNvGrpSpPr/>
+          <p:nvPr/>
+        </p:nvGrpSpPr>
+        <p:grpSpPr>
+          <a:xfrm>
+            <a:off x="1863480" y="-346197"/>
+            <a:ext cx="1916483" cy="1916483"/>
+            <a:chOff x="10186336" y="207462"/>
+            <a:chExt cx="1916483" cy="1916483"/>
+          </a:xfrm>
+        </p:grpSpPr>
+        <p:pic>
+          <p:nvPicPr>
+            <p:cNvPr id="5" name="Imagem 4" descr="Teclado de computador&#10;&#10;Descrição gerada automaticamente">
+              <a:extLst>
+                <a:ext uri="{FF2B5EF4-FFF2-40B4-BE49-F238E27FC236}">
+                  <a16:creationId xmlns:a16="http://schemas.microsoft.com/office/drawing/2014/main" id="{DC10494B-E29F-4095-B00F-C8E55B50B3D2}"/>
+                </a:ext>
+              </a:extLst>
+            </p:cNvPr>
+            <p:cNvPicPr>
+              <a:picLocks noChangeAspect="1"/>
+            </p:cNvPicPr>
+            <p:nvPr/>
+          </p:nvPicPr>
+          <p:blipFill>
+            <a:blip r:embed="rId13">
+              <a:extLst>
+                <a:ext uri="{BEBA8EAE-BF5A-486C-A8C5-ECC9F3942E4B}">
+                  <a14:imgProps xmlns:a14="http://schemas.microsoft.com/office/drawing/2010/main">
+                    <a14:imgLayer r:embed="rId14">
+                      <a14:imgEffect>
+                        <a14:brightnessContrast bright="-40000" contrast="40000"/>
+                      </a14:imgEffect>
+                    </a14:imgLayer>
+                  </a14:imgProps>
+                </a:ext>
+                <a:ext uri="{28A0092B-C50C-407E-A947-70E740481C1C}">
+                  <a14:useLocalDpi xmlns:a14="http://schemas.microsoft.com/office/drawing/2010/main" val="0"/>
+                </a:ext>
+              </a:extLst>
+            </a:blip>
+            <a:stretch>
+              <a:fillRect/>
+            </a:stretch>
+          </p:blipFill>
+          <p:spPr>
+            <a:xfrm>
+              <a:off x="10186336" y="207462"/>
+              <a:ext cx="1916483" cy="1916483"/>
+            </a:xfrm>
+            <a:prstGeom prst="rect">
+              <a:avLst/>
+            </a:prstGeom>
+          </p:spPr>
+        </p:pic>
+        <p:pic>
+          <p:nvPicPr>
+            <p:cNvPr id="9" name="Imagem 8" descr="Uma imagem contendo desenho&#10;&#10;Descrição gerada automaticamente">
+              <a:extLst>
+                <a:ext uri="{FF2B5EF4-FFF2-40B4-BE49-F238E27FC236}">
+                  <a16:creationId xmlns:a16="http://schemas.microsoft.com/office/drawing/2014/main" id="{DB78A706-70B8-4397-9B0F-FF80E2A4E513}"/>
+                </a:ext>
+              </a:extLst>
+            </p:cNvPr>
+            <p:cNvPicPr>
+              <a:picLocks noChangeAspect="1"/>
+            </p:cNvPicPr>
+            <p:nvPr/>
+          </p:nvPicPr>
+          <p:blipFill>
+            <a:blip r:embed="rId24">
+              <a:extLst>
+                <a:ext uri="{28A0092B-C50C-407E-A947-70E740481C1C}">
+                  <a14:useLocalDpi xmlns:a14="http://schemas.microsoft.com/office/drawing/2010/main" val="0"/>
+                </a:ext>
+              </a:extLst>
+            </a:blip>
+            <a:stretch>
+              <a:fillRect/>
+            </a:stretch>
+          </p:blipFill>
+          <p:spPr>
+            <a:xfrm>
+              <a:off x="10436036" y="587705"/>
+              <a:ext cx="1013329" cy="519836"/>
+            </a:xfrm>
+            <a:prstGeom prst="rect">
+              <a:avLst/>
+            </a:prstGeom>
+          </p:spPr>
+        </p:pic>
+        <p:pic>
+          <p:nvPicPr>
+            <p:cNvPr id="18" name="Imagem 17" descr="Uma imagem contendo Forma&#10;&#10;Descrição gerada automaticamente">
+              <a:extLst>
+                <a:ext uri="{FF2B5EF4-FFF2-40B4-BE49-F238E27FC236}">
+                  <a16:creationId xmlns:a16="http://schemas.microsoft.com/office/drawing/2014/main" id="{72061F49-A444-473A-BD81-1F4F83EB383C}"/>
+                </a:ext>
+              </a:extLst>
+            </p:cNvPr>
+            <p:cNvPicPr>
+              <a:picLocks noChangeAspect="1"/>
+            </p:cNvPicPr>
+            <p:nvPr/>
+          </p:nvPicPr>
+          <p:blipFill>
+            <a:blip r:embed="rId25">
+              <a:extLst>
+                <a:ext uri="{28A0092B-C50C-407E-A947-70E740481C1C}">
+                  <a14:useLocalDpi xmlns:a14="http://schemas.microsoft.com/office/drawing/2010/main" val="0"/>
+                </a:ext>
+              </a:extLst>
+            </a:blip>
+            <a:stretch>
+              <a:fillRect/>
+            </a:stretch>
+          </p:blipFill>
+          <p:spPr>
+            <a:xfrm>
+              <a:off x="11277820" y="710421"/>
+              <a:ext cx="137204" cy="137202"/>
+            </a:xfrm>
+            <a:prstGeom prst="rect">
+              <a:avLst/>
+            </a:prstGeom>
+          </p:spPr>
+        </p:pic>
+      </p:grpSp>
+      <p:sp>
+        <p:nvSpPr>
+          <p:cNvPr id="11" name="CaixaDeTexto 10">
+            <a:extLst>
+              <a:ext uri="{FF2B5EF4-FFF2-40B4-BE49-F238E27FC236}">
+                <a16:creationId xmlns:a16="http://schemas.microsoft.com/office/drawing/2014/main" id="{61090381-D74C-48CE-A63D-C1E72D40917A}"/>
+              </a:ext>
+            </a:extLst>
+          </p:cNvPr>
+          <p:cNvSpPr txBox="1"/>
+          <p:nvPr/>
+        </p:nvSpPr>
+        <p:spPr>
+          <a:xfrm>
+            <a:off x="2136482" y="1846343"/>
+            <a:ext cx="1203287" cy="369332"/>
+          </a:xfrm>
+          <a:prstGeom prst="rect">
+            <a:avLst/>
+          </a:prstGeom>
+          <a:noFill/>
+        </p:spPr>
+        <p:txBody>
+          <a:bodyPr wrap="square">
+            <a:spAutoFit/>
+          </a:bodyPr>
+          <a:lstStyle/>
+          <a:p>
+            <a:r>
+              <a:rPr lang="sv-SE" b="1" dirty="0"/>
+              <a:t>wi-fi / Lan</a:t>
+            </a:r>
+            <a:endParaRPr lang="pt-BR" b="1" dirty="0"/>
+          </a:p>
+        </p:txBody>
+      </p:sp>
+      <p:pic>
+        <p:nvPicPr>
+          <p:cNvPr id="112" name="Imagem 111" descr="Uma imagem contendo Forma&#10;&#10;Descrição gerada automaticamente">
+            <a:extLst>
+              <a:ext uri="{FF2B5EF4-FFF2-40B4-BE49-F238E27FC236}">
+                <a16:creationId xmlns:a16="http://schemas.microsoft.com/office/drawing/2014/main" id="{E6C9F10A-8D94-40F0-B7EA-023CD6DDB228}"/>
+              </a:ext>
+            </a:extLst>
+          </p:cNvPr>
+          <p:cNvPicPr>
+            <a:picLocks noChangeAspect="1"/>
+          </p:cNvPicPr>
+          <p:nvPr/>
+        </p:nvPicPr>
+        <p:blipFill>
+          <a:blip r:embed="rId15">
+            <a:extLst>
+              <a:ext uri="{28A0092B-C50C-407E-A947-70E740481C1C}">
+                <a14:useLocalDpi xmlns:a14="http://schemas.microsoft.com/office/drawing/2010/main" val="0"/>
+              </a:ext>
+            </a:extLst>
+          </a:blip>
+          <a:stretch>
+            <a:fillRect/>
+          </a:stretch>
+        </p:blipFill>
+        <p:spPr>
+          <a:xfrm>
+            <a:off x="2499205" y="2205402"/>
+            <a:ext cx="383115" cy="383115"/>
           </a:xfrm>
           <a:prstGeom prst="rect">
             <a:avLst/>

</xml_diff>